<commit_message>
drobne upravy v 2 prednaske
</commit_message>
<xml_diff>
--- a/en/lectures/02/2_Introduction_to_Python.pptx
+++ b/en/lectures/02/2_Introduction_to_Python.pptx
@@ -221,7 +221,7 @@
           <a:p>
             <a:fld id="{21865E2F-29E8-4495-A6BA-69A593AAF28F}" type="datetimeFigureOut">
               <a:rPr lang="sk-SK" smtClean="0"/>
-              <a:t>16. 9. 2019</a:t>
+              <a:t>2. 10. 2019</a:t>
             </a:fld>
             <a:endParaRPr lang="sk-SK"/>
           </a:p>
@@ -620,7 +620,7 @@
           <a:p>
             <a:fld id="{AE40A83B-24CB-4FF7-9262-5C909CA95ED4}" type="datetimeFigureOut">
               <a:rPr lang="sk-SK" smtClean="0"/>
-              <a:t>16. 9. 2019</a:t>
+              <a:t>2. 10. 2019</a:t>
             </a:fld>
             <a:endParaRPr lang="sk-SK"/>
           </a:p>
@@ -838,7 +838,7 @@
           <a:p>
             <a:fld id="{AE40A83B-24CB-4FF7-9262-5C909CA95ED4}" type="datetimeFigureOut">
               <a:rPr lang="sk-SK" smtClean="0"/>
-              <a:t>16. 9. 2019</a:t>
+              <a:t>2. 10. 2019</a:t>
             </a:fld>
             <a:endParaRPr lang="sk-SK"/>
           </a:p>
@@ -1066,7 +1066,7 @@
           <a:p>
             <a:fld id="{AE40A83B-24CB-4FF7-9262-5C909CA95ED4}" type="datetimeFigureOut">
               <a:rPr lang="sk-SK" smtClean="0"/>
-              <a:t>16. 9. 2019</a:t>
+              <a:t>2. 10. 2019</a:t>
             </a:fld>
             <a:endParaRPr lang="sk-SK"/>
           </a:p>
@@ -1284,7 +1284,7 @@
           <a:p>
             <a:fld id="{AE40A83B-24CB-4FF7-9262-5C909CA95ED4}" type="datetimeFigureOut">
               <a:rPr lang="sk-SK" smtClean="0"/>
-              <a:t>16. 9. 2019</a:t>
+              <a:t>2. 10. 2019</a:t>
             </a:fld>
             <a:endParaRPr lang="sk-SK"/>
           </a:p>
@@ -1528,7 +1528,7 @@
           <a:p>
             <a:fld id="{AE40A83B-24CB-4FF7-9262-5C909CA95ED4}" type="datetimeFigureOut">
               <a:rPr lang="sk-SK" smtClean="0"/>
-              <a:t>16. 9. 2019</a:t>
+              <a:t>2. 10. 2019</a:t>
             </a:fld>
             <a:endParaRPr lang="sk-SK"/>
           </a:p>
@@ -1760,7 +1760,7 @@
           <a:p>
             <a:fld id="{AE40A83B-24CB-4FF7-9262-5C909CA95ED4}" type="datetimeFigureOut">
               <a:rPr lang="sk-SK" smtClean="0"/>
-              <a:t>16. 9. 2019</a:t>
+              <a:t>2. 10. 2019</a:t>
             </a:fld>
             <a:endParaRPr lang="sk-SK"/>
           </a:p>
@@ -2127,7 +2127,7 @@
           <a:p>
             <a:fld id="{AE40A83B-24CB-4FF7-9262-5C909CA95ED4}" type="datetimeFigureOut">
               <a:rPr lang="sk-SK" smtClean="0"/>
-              <a:t>16. 9. 2019</a:t>
+              <a:t>2. 10. 2019</a:t>
             </a:fld>
             <a:endParaRPr lang="sk-SK"/>
           </a:p>
@@ -2245,7 +2245,7 @@
           <a:p>
             <a:fld id="{AE40A83B-24CB-4FF7-9262-5C909CA95ED4}" type="datetimeFigureOut">
               <a:rPr lang="sk-SK" smtClean="0"/>
-              <a:t>16. 9. 2019</a:t>
+              <a:t>2. 10. 2019</a:t>
             </a:fld>
             <a:endParaRPr lang="sk-SK"/>
           </a:p>
@@ -2340,7 +2340,7 @@
           <a:p>
             <a:fld id="{AE40A83B-24CB-4FF7-9262-5C909CA95ED4}" type="datetimeFigureOut">
               <a:rPr lang="sk-SK" smtClean="0"/>
-              <a:t>16. 9. 2019</a:t>
+              <a:t>2. 10. 2019</a:t>
             </a:fld>
             <a:endParaRPr lang="sk-SK"/>
           </a:p>
@@ -2665,7 +2665,7 @@
           <a:p>
             <a:fld id="{AE40A83B-24CB-4FF7-9262-5C909CA95ED4}" type="datetimeFigureOut">
               <a:rPr lang="sk-SK" smtClean="0"/>
-              <a:t>16. 9. 2019</a:t>
+              <a:t>2. 10. 2019</a:t>
             </a:fld>
             <a:endParaRPr lang="sk-SK"/>
           </a:p>
@@ -2970,7 +2970,7 @@
           <a:p>
             <a:fld id="{AE40A83B-24CB-4FF7-9262-5C909CA95ED4}" type="datetimeFigureOut">
               <a:rPr lang="sk-SK" smtClean="0"/>
-              <a:t>16. 9. 2019</a:t>
+              <a:t>2. 10. 2019</a:t>
             </a:fld>
             <a:endParaRPr lang="sk-SK"/>
           </a:p>
@@ -3231,7 +3231,7 @@
           <a:p>
             <a:fld id="{AE40A83B-24CB-4FF7-9262-5C909CA95ED4}" type="datetimeFigureOut">
               <a:rPr lang="sk-SK" smtClean="0"/>
-              <a:t>16. 9. 2019</a:t>
+              <a:t>2. 10. 2019</a:t>
             </a:fld>
             <a:endParaRPr lang="sk-SK"/>
           </a:p>
@@ -3929,19 +3929,11 @@
             </a:r>
             <a:r>
               <a:rPr lang="en-US" dirty="0" err="1" smtClean="0"/>
-              <a:t>too_</a:t>
-            </a:r>
-            <a:r>
-              <a:rPr lang="en-US" dirty="0" err="1" smtClean="0"/>
-              <a:t>much</a:t>
-            </a:r>
-            <a:r>
-              <a:rPr lang="en-US" dirty="0" smtClean="0"/>
-              <a:t>] </a:t>
-            </a:r>
-            <a:r>
-              <a:rPr lang="en-US" dirty="0" smtClean="0"/>
-              <a:t>[:</a:t>
+              <a:t>too_much</a:t>
+            </a:r>
+            <a:r>
+              <a:rPr lang="en-US" dirty="0" smtClean="0"/>
+              <a:t>] [:</a:t>
             </a:r>
             <a:r>
               <a:rPr lang="en-US" dirty="0" err="1" smtClean="0"/>
@@ -3959,7 +3951,6 @@
               <a:rPr lang="en-US" dirty="0" smtClean="0"/>
               <a:t>]</a:t>
             </a:r>
-            <a:endParaRPr lang="en-US" dirty="0" smtClean="0"/>
           </a:p>
           <a:p>
             <a:pPr lvl="1"/>
@@ -3986,7 +3977,6 @@
               <a:rPr lang="en-US" dirty="0" smtClean="0"/>
               <a:t>List</a:t>
             </a:r>
-            <a:endParaRPr lang="en-US" dirty="0" smtClean="0"/>
           </a:p>
           <a:p>
             <a:pPr lvl="1"/>
@@ -4037,11 +4027,7 @@
             </a:r>
             <a:r>
               <a:rPr lang="sk-SK" dirty="0" smtClean="0"/>
-              <a:t> </a:t>
-            </a:r>
-            <a:r>
-              <a:rPr lang="sk-SK" dirty="0" smtClean="0"/>
-              <a:t>(</a:t>
+              <a:t> (</a:t>
             </a:r>
             <a:r>
               <a:rPr lang="sk-SK" dirty="0" err="1" smtClean="0"/>
@@ -5255,11 +5241,7 @@
             </a:r>
             <a:r>
               <a:rPr lang="sk-SK" dirty="0" smtClean="0"/>
-              <a:t> </a:t>
-            </a:r>
-            <a:r>
-              <a:rPr lang="sk-SK" dirty="0" smtClean="0"/>
-              <a:t>a</a:t>
+              <a:t> a</a:t>
             </a:r>
             <a:r>
               <a:rPr lang="en-US" dirty="0" err="1" smtClean="0"/>
@@ -5642,6 +5624,36 @@
           </a:p>
         </p:txBody>
       </p:sp>
+      <p:sp>
+        <p:nvSpPr>
+          <p:cNvPr id="4" name="TextBox 3"/>
+          <p:cNvSpPr txBox="1"/>
+          <p:nvPr/>
+        </p:nvSpPr>
+        <p:spPr>
+          <a:xfrm>
+            <a:off x="905933" y="5528733"/>
+            <a:ext cx="6737357" cy="369332"/>
+          </a:xfrm>
+          <a:prstGeom prst="rect">
+            <a:avLst/>
+          </a:prstGeom>
+          <a:noFill/>
+        </p:spPr>
+        <p:txBody>
+          <a:bodyPr wrap="none" rtlCol="0">
+            <a:spAutoFit/>
+          </a:bodyPr>
+          <a:lstStyle/>
+          <a:p>
+            <a:r>
+              <a:rPr lang="en-GB" dirty="0" smtClean="0"/>
+              <a:t>Execution flow reaches else if the cycle is not interrupted prematurely</a:t>
+            </a:r>
+            <a:endParaRPr lang="en-GB" dirty="0"/>
+          </a:p>
+        </p:txBody>
+      </p:sp>
     </p:spTree>
     <p:extLst>
       <p:ext uri="{BB962C8B-B14F-4D97-AF65-F5344CB8AC3E}">
@@ -5760,7 +5772,6 @@
               <a:rPr lang="en-US" dirty="0" smtClean="0"/>
               <a:t>documentation comment</a:t>
             </a:r>
-            <a:endParaRPr lang="en-US" dirty="0" smtClean="0"/>
           </a:p>
           <a:p>
             <a:r>
@@ -5779,11 +5790,7 @@
             </a:r>
             <a:r>
               <a:rPr lang="en-US" dirty="0" smtClean="0"/>
-              <a:t> </a:t>
-            </a:r>
-            <a:r>
-              <a:rPr lang="en-US" dirty="0" smtClean="0"/>
-              <a:t>ends function, returns value</a:t>
+              <a:t> ends function, returns value</a:t>
             </a:r>
             <a:endParaRPr lang="sk-SK" dirty="0" smtClean="0"/>
           </a:p>
@@ -6176,7 +6183,6 @@
               <a:rPr lang="en-US" dirty="0" smtClean="0"/>
               <a:t>Attention!!! Preset value is evaluated in the time of definition</a:t>
             </a:r>
-            <a:endParaRPr lang="en-US" dirty="0" smtClean="0"/>
           </a:p>
           <a:p>
             <a:pPr lvl="1"/>
@@ -6855,11 +6861,7 @@
           <a:p>
             <a:r>
               <a:rPr lang="en-US" dirty="0" smtClean="0"/>
-              <a:t>* </a:t>
-            </a:r>
-            <a:r>
-              <a:rPr lang="en-US" dirty="0" smtClean="0"/>
-              <a:t>marks list of parameters</a:t>
+              <a:t>* marks list of parameters</a:t>
             </a:r>
             <a:endParaRPr lang="sk-SK" dirty="0" smtClean="0"/>
           </a:p>
@@ -6875,19 +6877,11 @@
               </a:rPr>
               <a:t>list</a:t>
             </a:r>
-            <a:endParaRPr lang="sk-SK" dirty="0" smtClean="0">
-              <a:latin typeface="Courier New" panose="02070309020205020404" pitchFamily="49" charset="0"/>
-              <a:cs typeface="Courier New" panose="02070309020205020404" pitchFamily="49" charset="0"/>
-            </a:endParaRPr>
-          </a:p>
-          <a:p>
-            <a:r>
-              <a:rPr lang="en-US" dirty="0" smtClean="0"/>
-              <a:t>** </a:t>
-            </a:r>
-            <a:r>
-              <a:rPr lang="en-US" dirty="0" smtClean="0"/>
-              <a:t>marks named parameters</a:t>
+          </a:p>
+          <a:p>
+            <a:r>
+              <a:rPr lang="en-US" dirty="0" smtClean="0"/>
+              <a:t>** marks named parameters</a:t>
             </a:r>
             <a:endParaRPr lang="sk-SK" dirty="0" smtClean="0"/>
           </a:p>
@@ -9704,7 +9698,6 @@
               <a:rPr lang="sk-SK" dirty="0" smtClean="0"/>
               <a:t>:</a:t>
             </a:r>
-            <a:endParaRPr lang="sk-SK" dirty="0" smtClean="0"/>
           </a:p>
           <a:p>
             <a:pPr lvl="1"/>
@@ -9805,6 +9798,132 @@
                 </a:solidFill>
               </a:rPr>
               <a:t>)</a:t>
+            </a:r>
+          </a:p>
+          <a:p>
+            <a:pPr lvl="2"/>
+            <a:r>
+              <a:rPr lang="en-US" dirty="0" smtClean="0"/>
+              <a:t>Limited stack size</a:t>
+            </a:r>
+            <a:r>
+              <a:rPr lang="sk-SK" dirty="0" smtClean="0"/>
+              <a:t> </a:t>
+            </a:r>
+            <a:r>
+              <a:rPr lang="sk-SK" dirty="0" smtClean="0">
+                <a:solidFill>
+                  <a:schemeClr val="bg1">
+                    <a:lumMod val="50000"/>
+                  </a:schemeClr>
+                </a:solidFill>
+              </a:rPr>
+              <a:t>(</a:t>
+            </a:r>
+            <a:r>
+              <a:rPr lang="en-US" dirty="0" smtClean="0">
+                <a:solidFill>
+                  <a:schemeClr val="bg1">
+                    <a:lumMod val="50000"/>
+                  </a:schemeClr>
+                </a:solidFill>
+              </a:rPr>
+              <a:t>not in </a:t>
+            </a:r>
+            <a:r>
+              <a:rPr lang="sk-SK" dirty="0" err="1" smtClean="0">
+                <a:solidFill>
+                  <a:schemeClr val="bg1">
+                    <a:lumMod val="50000"/>
+                  </a:schemeClr>
+                </a:solidFill>
+              </a:rPr>
+              <a:t>PyPy</a:t>
+            </a:r>
+            <a:r>
+              <a:rPr lang="sk-SK" dirty="0" smtClean="0">
+                <a:solidFill>
+                  <a:schemeClr val="bg1">
+                    <a:lumMod val="50000"/>
+                  </a:schemeClr>
+                </a:solidFill>
+              </a:rPr>
+              <a:t>)</a:t>
+            </a:r>
+          </a:p>
+          <a:p>
+            <a:pPr lvl="2"/>
+            <a:r>
+              <a:rPr lang="en-US" dirty="0" smtClean="0"/>
+              <a:t>Missing </a:t>
+            </a:r>
+            <a:r>
+              <a:rPr lang="en-US" dirty="0" err="1" smtClean="0"/>
+              <a:t>optimalziation</a:t>
+            </a:r>
+            <a:r>
+              <a:rPr lang="en-US" dirty="0" smtClean="0"/>
+              <a:t> of tail recursion</a:t>
+            </a:r>
+            <a:endParaRPr lang="sk-SK" dirty="0" smtClean="0"/>
+          </a:p>
+          <a:p>
+            <a:pPr lvl="2"/>
+            <a:r>
+              <a:rPr lang="en-US" dirty="0" smtClean="0"/>
+              <a:t>A lot of functional features are missing</a:t>
+            </a:r>
+            <a:endParaRPr lang="sk-SK" dirty="0" smtClean="0"/>
+          </a:p>
+          <a:p>
+            <a:pPr lvl="3"/>
+            <a:r>
+              <a:rPr lang="en-US" dirty="0" smtClean="0"/>
+              <a:t>Many of them can be added through package imports</a:t>
+            </a:r>
+            <a:endParaRPr lang="sk-SK" dirty="0" smtClean="0"/>
+          </a:p>
+          <a:p>
+            <a:pPr lvl="2"/>
+            <a:r>
+              <a:rPr lang="en-US" dirty="0" smtClean="0"/>
+              <a:t>Due to dynamic typing, there is no </a:t>
+            </a:r>
+            <a:r>
+              <a:rPr lang="en-US" u="sng" dirty="0" smtClean="0"/>
+              <a:t>direct</a:t>
+            </a:r>
+            <a:r>
+              <a:rPr lang="en-US" dirty="0" smtClean="0"/>
+              <a:t> support for </a:t>
+            </a:r>
+            <a:r>
+              <a:rPr lang="sk-SK" dirty="0" err="1" smtClean="0"/>
+              <a:t>pattern</a:t>
+            </a:r>
+            <a:r>
+              <a:rPr lang="sk-SK" dirty="0" smtClean="0"/>
+              <a:t> </a:t>
+            </a:r>
+            <a:r>
+              <a:rPr lang="sk-SK" dirty="0" err="1" smtClean="0"/>
+              <a:t>matching</a:t>
+            </a:r>
+            <a:endParaRPr lang="sk-SK" dirty="0" smtClean="0"/>
+          </a:p>
+          <a:p>
+            <a:pPr lvl="1"/>
+            <a:r>
+              <a:rPr lang="en-US" dirty="0" smtClean="0"/>
+              <a:t>Slightly different object model as you are </a:t>
+            </a:r>
+            <a:r>
+              <a:rPr lang="en-US" dirty="0" err="1" smtClean="0"/>
+              <a:t>accustumated</a:t>
+            </a:r>
+            <a:r>
+              <a:rPr lang="en-US" dirty="0" smtClean="0"/>
+              <a:t> from Java</a:t>
             </a:r>
             <a:endParaRPr lang="sk-SK" dirty="0" smtClean="0">
               <a:solidFill>
@@ -9818,146 +9937,6 @@
             <a:pPr lvl="2"/>
             <a:r>
               <a:rPr lang="en-US" dirty="0" smtClean="0"/>
-              <a:t>Limited stack size</a:t>
-            </a:r>
-            <a:r>
-              <a:rPr lang="sk-SK" dirty="0" smtClean="0"/>
-              <a:t> </a:t>
-            </a:r>
-            <a:r>
-              <a:rPr lang="sk-SK" dirty="0" smtClean="0">
-                <a:solidFill>
-                  <a:schemeClr val="bg1">
-                    <a:lumMod val="50000"/>
-                  </a:schemeClr>
-                </a:solidFill>
-              </a:rPr>
-              <a:t>(</a:t>
-            </a:r>
-            <a:r>
-              <a:rPr lang="en-US" dirty="0" smtClean="0">
-                <a:solidFill>
-                  <a:schemeClr val="bg1">
-                    <a:lumMod val="50000"/>
-                  </a:schemeClr>
-                </a:solidFill>
-              </a:rPr>
-              <a:t>not in </a:t>
-            </a:r>
-            <a:r>
-              <a:rPr lang="sk-SK" dirty="0" err="1" smtClean="0">
-                <a:solidFill>
-                  <a:schemeClr val="bg1">
-                    <a:lumMod val="50000"/>
-                  </a:schemeClr>
-                </a:solidFill>
-              </a:rPr>
-              <a:t>PyPy</a:t>
-            </a:r>
-            <a:r>
-              <a:rPr lang="sk-SK" dirty="0" smtClean="0">
-                <a:solidFill>
-                  <a:schemeClr val="bg1">
-                    <a:lumMod val="50000"/>
-                  </a:schemeClr>
-                </a:solidFill>
-              </a:rPr>
-              <a:t>)</a:t>
-            </a:r>
-            <a:endParaRPr lang="sk-SK" dirty="0" smtClean="0">
-              <a:solidFill>
-                <a:schemeClr val="bg1">
-                  <a:lumMod val="50000"/>
-                </a:schemeClr>
-              </a:solidFill>
-            </a:endParaRPr>
-          </a:p>
-          <a:p>
-            <a:pPr lvl="2"/>
-            <a:r>
-              <a:rPr lang="en-US" dirty="0" smtClean="0"/>
-              <a:t>Missing </a:t>
-            </a:r>
-            <a:r>
-              <a:rPr lang="en-US" dirty="0" err="1" smtClean="0"/>
-              <a:t>optimalziation</a:t>
-            </a:r>
-            <a:r>
-              <a:rPr lang="en-US" dirty="0" smtClean="0"/>
-              <a:t> of tail recursion</a:t>
-            </a:r>
-            <a:endParaRPr lang="sk-SK" dirty="0" smtClean="0"/>
-          </a:p>
-          <a:p>
-            <a:pPr lvl="2"/>
-            <a:r>
-              <a:rPr lang="en-US" dirty="0" smtClean="0"/>
-              <a:t>A lot of functional features are missing</a:t>
-            </a:r>
-            <a:endParaRPr lang="sk-SK" dirty="0" smtClean="0"/>
-          </a:p>
-          <a:p>
-            <a:pPr lvl="3"/>
-            <a:r>
-              <a:rPr lang="en-US" dirty="0" smtClean="0"/>
-              <a:t>Many of them can be added through package imports</a:t>
-            </a:r>
-            <a:endParaRPr lang="sk-SK" dirty="0" smtClean="0"/>
-          </a:p>
-          <a:p>
-            <a:pPr lvl="2"/>
-            <a:r>
-              <a:rPr lang="en-US" dirty="0" smtClean="0"/>
-              <a:t>Due to dynamic typing, there is no </a:t>
-            </a:r>
-            <a:r>
-              <a:rPr lang="en-US" u="sng" dirty="0" smtClean="0"/>
-              <a:t>direct</a:t>
-            </a:r>
-            <a:r>
-              <a:rPr lang="en-US" dirty="0" smtClean="0"/>
-              <a:t> support for </a:t>
-            </a:r>
-            <a:r>
-              <a:rPr lang="sk-SK" dirty="0" err="1" smtClean="0"/>
-              <a:t>pattern</a:t>
-            </a:r>
-            <a:r>
-              <a:rPr lang="sk-SK" dirty="0" smtClean="0"/>
-              <a:t> </a:t>
-            </a:r>
-            <a:r>
-              <a:rPr lang="sk-SK" dirty="0" err="1" smtClean="0"/>
-              <a:t>matching</a:t>
-            </a:r>
-            <a:endParaRPr lang="sk-SK" dirty="0" smtClean="0"/>
-          </a:p>
-          <a:p>
-            <a:pPr lvl="1"/>
-            <a:r>
-              <a:rPr lang="en-US" dirty="0" smtClean="0"/>
-              <a:t>Slightly different object model as you are </a:t>
-            </a:r>
-            <a:r>
-              <a:rPr lang="en-US" dirty="0" err="1" smtClean="0"/>
-              <a:t>accustumated</a:t>
-            </a:r>
-            <a:r>
-              <a:rPr lang="en-US" dirty="0" smtClean="0"/>
-              <a:t> from Java</a:t>
-            </a:r>
-            <a:endParaRPr lang="sk-SK" dirty="0" smtClean="0">
-              <a:solidFill>
-                <a:schemeClr val="bg1">
-                  <a:lumMod val="50000"/>
-                </a:schemeClr>
-              </a:solidFill>
-            </a:endParaRPr>
-          </a:p>
-          <a:p>
-            <a:pPr lvl="2"/>
-            <a:r>
-              <a:rPr lang="en-US" dirty="0" smtClean="0"/>
               <a:t>No direct method overloading</a:t>
             </a:r>
             <a:endParaRPr lang="sk-SK" dirty="0" smtClean="0"/>
@@ -9990,11 +9969,7 @@
             </a:r>
             <a:r>
               <a:rPr lang="sk-SK" dirty="0" smtClean="0"/>
-              <a:t> </a:t>
-            </a:r>
-            <a:r>
-              <a:rPr lang="sk-SK" dirty="0" smtClean="0"/>
-              <a:t>...</a:t>
+              <a:t> ...</a:t>
             </a:r>
             <a:r>
               <a:rPr lang="en-US" dirty="0" smtClean="0"/>
@@ -10313,11 +10288,7 @@
           <a:p>
             <a:r>
               <a:rPr lang="en-US" dirty="0" smtClean="0"/>
-              <a:t>Tutorial </a:t>
-            </a:r>
-            <a:r>
-              <a:rPr lang="en-US" dirty="0" smtClean="0"/>
-              <a:t>of Python</a:t>
+              <a:t>Tutorial of Python</a:t>
             </a:r>
             <a:endParaRPr lang="sk-SK" dirty="0"/>
           </a:p>
@@ -10371,11 +10342,7 @@
             </a:r>
             <a:r>
               <a:rPr lang="sk-SK" sz="2400" dirty="0" smtClean="0"/>
-              <a:t> </a:t>
-            </a:r>
-            <a:r>
-              <a:rPr lang="sk-SK" sz="2400" dirty="0" smtClean="0"/>
-              <a:t>3.5 </a:t>
+              <a:t> 3.5 </a:t>
             </a:r>
             <a:r>
               <a:rPr lang="en-US" sz="2400" dirty="0" smtClean="0"/>
@@ -10459,21 +10426,7 @@
                 <a:latin typeface="Courier New" panose="02070309020205020404" pitchFamily="49" charset="0"/>
                 <a:cs typeface="Courier New" panose="02070309020205020404" pitchFamily="49" charset="0"/>
               </a:rPr>
-              <a:t>:\</a:t>
-            </a:r>
-            <a:r>
-              <a:rPr lang="en-US" sz="1200" dirty="0" smtClean="0">
-                <a:latin typeface="Courier New" panose="02070309020205020404" pitchFamily="49" charset="0"/>
-                <a:cs typeface="Courier New" panose="02070309020205020404" pitchFamily="49" charset="0"/>
-              </a:rPr>
-              <a:t>path</a:t>
-            </a:r>
-            <a:r>
-              <a:rPr lang="en-US" sz="1200" dirty="0" smtClean="0">
-                <a:latin typeface="Courier New" panose="02070309020205020404" pitchFamily="49" charset="0"/>
-                <a:cs typeface="Courier New" panose="02070309020205020404" pitchFamily="49" charset="0"/>
-              </a:rPr>
-              <a:t>\somewhere&gt; python</a:t>
+              <a:t>:\path\somewhere&gt; python</a:t>
             </a:r>
             <a:endParaRPr lang="en-US" sz="1200" dirty="0">
               <a:latin typeface="Courier New" panose="02070309020205020404" pitchFamily="49" charset="0"/>

</xml_diff>